<commit_message>
Added inset in the frequency bias plot to show better the values closed to 1.
</commit_message>
<xml_diff>
--- a/chapter_05/figures/rainfall_based_ff_verif_overall_scores.pptx
+++ b/chapter_05/figures/rainfall_based_ff_verif_overall_scores.pptx
@@ -104,13 +104,18 @@
       </a:defRPr>
     </a:lvl9pPr>
   </p:defaultTextStyle>
+  <p:extLst>
+    <p:ext uri="{EFAFB233-063F-42B5-8137-9DF3F51BA10A}">
+      <p15:sldGuideLst xmlns:p15="http://schemas.microsoft.com/office/powerpoint/2012/main"/>
+    </p:ext>
+  </p:extLst>
 </p:presentation>
 </file>
 
 <file path=ppt/revisionInfo.xml><?xml version="1.0" encoding="utf-8"?>
 <p1510:revInfo xmlns:a="http://schemas.openxmlformats.org/drawingml/2006/main" xmlns:r="http://schemas.openxmlformats.org/officeDocument/2006/relationships" xmlns:p1510="http://schemas.microsoft.com/office/powerpoint/2015/10/main">
   <p1510:revLst>
-    <p1510:client id="{81937EDE-744E-40B0-955C-4DD4FF246C01}" v="22" dt="2025-05-24T15:31:57.477"/>
+    <p1510:client id="{81937EDE-744E-40B0-955C-4DD4FF246C01}" v="36" dt="2025-05-24T16:00:06.088"/>
   </p1510:revLst>
 </p1510:revInfo>
 </file>
@@ -120,22 +125,126 @@
   <pc:docChgLst>
     <pc:chgData name="Fatima Pillosu" userId="a6295d4dc9e22643" providerId="LiveId" clId="{81937EDE-744E-40B0-955C-4DD4FF246C01}"/>
     <pc:docChg chg="undo custSel modSld">
-      <pc:chgData name="Fatima Pillosu" userId="a6295d4dc9e22643" providerId="LiveId" clId="{81937EDE-744E-40B0-955C-4DD4FF246C01}" dt="2025-05-24T15:31:58.647" v="738" actId="1035"/>
+      <pc:chgData name="Fatima Pillosu" userId="a6295d4dc9e22643" providerId="LiveId" clId="{81937EDE-744E-40B0-955C-4DD4FF246C01}" dt="2025-05-24T16:02:33.435" v="958" actId="1038"/>
       <pc:docMkLst>
         <pc:docMk/>
       </pc:docMkLst>
       <pc:sldChg chg="addSp delSp modSp mod">
-        <pc:chgData name="Fatima Pillosu" userId="a6295d4dc9e22643" providerId="LiveId" clId="{81937EDE-744E-40B0-955C-4DD4FF246C01}" dt="2025-05-24T15:31:58.647" v="738" actId="1035"/>
+        <pc:chgData name="Fatima Pillosu" userId="a6295d4dc9e22643" providerId="LiveId" clId="{81937EDE-744E-40B0-955C-4DD4FF246C01}" dt="2025-05-24T16:02:33.435" v="958" actId="1038"/>
         <pc:sldMkLst>
           <pc:docMk/>
           <pc:sldMk cId="4122425894" sldId="256"/>
         </pc:sldMkLst>
+        <pc:spChg chg="add mod">
+          <ac:chgData name="Fatima Pillosu" userId="a6295d4dc9e22643" providerId="LiveId" clId="{81937EDE-744E-40B0-955C-4DD4FF246C01}" dt="2025-05-24T16:02:33.435" v="958" actId="1038"/>
+          <ac:spMkLst>
+            <pc:docMk/>
+            <pc:sldMk cId="4122425894" sldId="256"/>
+            <ac:spMk id="4" creationId="{4CFD56CB-2BA5-3C24-4274-7CC3E331D223}"/>
+          </ac:spMkLst>
+        </pc:spChg>
+        <pc:spChg chg="add mod">
+          <ac:chgData name="Fatima Pillosu" userId="a6295d4dc9e22643" providerId="LiveId" clId="{81937EDE-744E-40B0-955C-4DD4FF246C01}" dt="2025-05-24T16:02:33.435" v="958" actId="1038"/>
+          <ac:spMkLst>
+            <pc:docMk/>
+            <pc:sldMk cId="4122425894" sldId="256"/>
+            <ac:spMk id="5" creationId="{F9DEE6FF-D6AA-D3A4-1B8F-F892AE389397}"/>
+          </ac:spMkLst>
+        </pc:spChg>
+        <pc:spChg chg="add mod">
+          <ac:chgData name="Fatima Pillosu" userId="a6295d4dc9e22643" providerId="LiveId" clId="{81937EDE-744E-40B0-955C-4DD4FF246C01}" dt="2025-05-24T16:02:33.435" v="958" actId="1038"/>
+          <ac:spMkLst>
+            <pc:docMk/>
+            <pc:sldMk cId="4122425894" sldId="256"/>
+            <ac:spMk id="6" creationId="{FD71727C-9004-3A14-698D-77D17BE5D7EC}"/>
+          </ac:spMkLst>
+        </pc:spChg>
+        <pc:spChg chg="add mod">
+          <ac:chgData name="Fatima Pillosu" userId="a6295d4dc9e22643" providerId="LiveId" clId="{81937EDE-744E-40B0-955C-4DD4FF246C01}" dt="2025-05-24T16:02:33.435" v="958" actId="1038"/>
+          <ac:spMkLst>
+            <pc:docMk/>
+            <pc:sldMk cId="4122425894" sldId="256"/>
+            <ac:spMk id="7" creationId="{AC24FE6F-76E9-183F-E2C2-8F82EB8E41D2}"/>
+          </ac:spMkLst>
+        </pc:spChg>
         <pc:spChg chg="add del mod">
           <ac:chgData name="Fatima Pillosu" userId="a6295d4dc9e22643" providerId="LiveId" clId="{81937EDE-744E-40B0-955C-4DD4FF246C01}" dt="2025-05-24T15:31:47.897" v="735" actId="21"/>
           <ac:spMkLst>
             <pc:docMk/>
             <pc:sldMk cId="4122425894" sldId="256"/>
             <ac:spMk id="8" creationId="{0A22D3D2-33E3-536C-ED6E-DA2D0B55AFCA}"/>
+          </ac:spMkLst>
+        </pc:spChg>
+        <pc:spChg chg="add mod">
+          <ac:chgData name="Fatima Pillosu" userId="a6295d4dc9e22643" providerId="LiveId" clId="{81937EDE-744E-40B0-955C-4DD4FF246C01}" dt="2025-05-24T16:02:33.435" v="958" actId="1038"/>
+          <ac:spMkLst>
+            <pc:docMk/>
+            <pc:sldMk cId="4122425894" sldId="256"/>
+            <ac:spMk id="8" creationId="{83DA8E06-AB13-6BC9-F39C-691A6BB7E371}"/>
+          </ac:spMkLst>
+        </pc:spChg>
+        <pc:spChg chg="add mod">
+          <ac:chgData name="Fatima Pillosu" userId="a6295d4dc9e22643" providerId="LiveId" clId="{81937EDE-744E-40B0-955C-4DD4FF246C01}" dt="2025-05-24T16:02:33.435" v="958" actId="1038"/>
+          <ac:spMkLst>
+            <pc:docMk/>
+            <pc:sldMk cId="4122425894" sldId="256"/>
+            <ac:spMk id="9" creationId="{5EA79853-4A16-E2A1-24AC-7446A89D913D}"/>
+          </ac:spMkLst>
+        </pc:spChg>
+        <pc:spChg chg="add mod">
+          <ac:chgData name="Fatima Pillosu" userId="a6295d4dc9e22643" providerId="LiveId" clId="{81937EDE-744E-40B0-955C-4DD4FF246C01}" dt="2025-05-24T16:02:33.435" v="958" actId="1038"/>
+          <ac:spMkLst>
+            <pc:docMk/>
+            <pc:sldMk cId="4122425894" sldId="256"/>
+            <ac:spMk id="10" creationId="{5AFED677-38B3-0F2F-3E5C-27D03445D9B1}"/>
+          </ac:spMkLst>
+        </pc:spChg>
+        <pc:spChg chg="add del mod">
+          <ac:chgData name="Fatima Pillosu" userId="a6295d4dc9e22643" providerId="LiveId" clId="{81937EDE-744E-40B0-955C-4DD4FF246C01}" dt="2025-05-24T15:58:28.455" v="846" actId="478"/>
+          <ac:spMkLst>
+            <pc:docMk/>
+            <pc:sldMk cId="4122425894" sldId="256"/>
+            <ac:spMk id="11" creationId="{B6A13621-04BA-1821-9CCD-CB0576A196ED}"/>
+          </ac:spMkLst>
+        </pc:spChg>
+        <pc:spChg chg="add mod">
+          <ac:chgData name="Fatima Pillosu" userId="a6295d4dc9e22643" providerId="LiveId" clId="{81937EDE-744E-40B0-955C-4DD4FF246C01}" dt="2025-05-24T16:02:33.435" v="958" actId="1038"/>
+          <ac:spMkLst>
+            <pc:docMk/>
+            <pc:sldMk cId="4122425894" sldId="256"/>
+            <ac:spMk id="12" creationId="{6F5546F9-CB50-DD52-CC62-D6D659D21FB0}"/>
+          </ac:spMkLst>
+        </pc:spChg>
+        <pc:spChg chg="add del mod">
+          <ac:chgData name="Fatima Pillosu" userId="a6295d4dc9e22643" providerId="LiveId" clId="{81937EDE-744E-40B0-955C-4DD4FF246C01}" dt="2025-05-24T15:59:04.695" v="853" actId="478"/>
+          <ac:spMkLst>
+            <pc:docMk/>
+            <pc:sldMk cId="4122425894" sldId="256"/>
+            <ac:spMk id="13" creationId="{E25D8D7F-AEFA-565C-5C8A-D08DF39F4D6B}"/>
+          </ac:spMkLst>
+        </pc:spChg>
+        <pc:spChg chg="add mod">
+          <ac:chgData name="Fatima Pillosu" userId="a6295d4dc9e22643" providerId="LiveId" clId="{81937EDE-744E-40B0-955C-4DD4FF246C01}" dt="2025-05-24T16:02:33.435" v="958" actId="1038"/>
+          <ac:spMkLst>
+            <pc:docMk/>
+            <pc:sldMk cId="4122425894" sldId="256"/>
+            <ac:spMk id="14" creationId="{22FA3513-546F-C72F-3736-768F809B9239}"/>
+          </ac:spMkLst>
+        </pc:spChg>
+        <pc:spChg chg="add mod">
+          <ac:chgData name="Fatima Pillosu" userId="a6295d4dc9e22643" providerId="LiveId" clId="{81937EDE-744E-40B0-955C-4DD4FF246C01}" dt="2025-05-24T16:02:33.435" v="958" actId="1038"/>
+          <ac:spMkLst>
+            <pc:docMk/>
+            <pc:sldMk cId="4122425894" sldId="256"/>
+            <ac:spMk id="15" creationId="{CB5C5868-E424-7CD4-5CDE-B799844A885B}"/>
+          </ac:spMkLst>
+        </pc:spChg>
+        <pc:spChg chg="add mod">
+          <ac:chgData name="Fatima Pillosu" userId="a6295d4dc9e22643" providerId="LiveId" clId="{81937EDE-744E-40B0-955C-4DD4FF246C01}" dt="2025-05-24T16:02:33.435" v="958" actId="1038"/>
+          <ac:spMkLst>
+            <pc:docMk/>
+            <pc:sldMk cId="4122425894" sldId="256"/>
+            <ac:spMk id="16" creationId="{680856A1-FEA5-20B4-16FD-C9DA06B7AA9C}"/>
           </ac:spMkLst>
         </pc:spChg>
         <pc:spChg chg="add del mod">
@@ -442,6 +551,14 @@
             <ac:spMk id="74" creationId="{3BD3CE7A-AEE9-D963-4344-84BC8740B771}"/>
           </ac:spMkLst>
         </pc:spChg>
+        <pc:picChg chg="add mod modCrop">
+          <ac:chgData name="Fatima Pillosu" userId="a6295d4dc9e22643" providerId="LiveId" clId="{81937EDE-744E-40B0-955C-4DD4FF246C01}" dt="2025-05-24T16:02:33.435" v="958" actId="1038"/>
+          <ac:picMkLst>
+            <pc:docMk/>
+            <pc:sldMk cId="4122425894" sldId="256"/>
+            <ac:picMk id="3" creationId="{2AC779A3-2F78-CEFF-DADF-B1AF64D891E9}"/>
+          </ac:picMkLst>
+        </pc:picChg>
         <pc:picChg chg="add del mod modCrop">
           <ac:chgData name="Fatima Pillosu" userId="a6295d4dc9e22643" providerId="LiveId" clId="{81937EDE-744E-40B0-955C-4DD4FF246C01}" dt="2025-05-24T15:31:47.897" v="735" actId="21"/>
           <ac:picMkLst>
@@ -536,6 +653,14 @@
             <pc:docMk/>
             <pc:sldMk cId="4122425894" sldId="256"/>
             <ac:cxnSpMk id="17" creationId="{A142B353-86A8-4CEA-793C-9443E919E4F3}"/>
+          </ac:cxnSpMkLst>
+        </pc:cxnChg>
+        <pc:cxnChg chg="add mod">
+          <ac:chgData name="Fatima Pillosu" userId="a6295d4dc9e22643" providerId="LiveId" clId="{81937EDE-744E-40B0-955C-4DD4FF246C01}" dt="2025-05-24T16:02:33.435" v="958" actId="1038"/>
+          <ac:cxnSpMkLst>
+            <pc:docMk/>
+            <pc:sldMk cId="4122425894" sldId="256"/>
+            <ac:cxnSpMk id="18" creationId="{4036828A-A657-178B-A1F5-BE26E3B05901}"/>
           </ac:cxnSpMkLst>
         </pc:cxnChg>
         <pc:cxnChg chg="add del mod">
@@ -4669,6 +4794,621 @@
           </a:p>
         </p:txBody>
       </p:sp>
+      <p:pic>
+        <p:nvPicPr>
+          <p:cNvPr id="3" name="Picture 2" descr="A graph of a line&#10;&#10;AI-generated content may be incorrect.">
+            <a:extLst>
+              <a:ext uri="{FF2B5EF4-FFF2-40B4-BE49-F238E27FC236}">
+                <a16:creationId xmlns:a16="http://schemas.microsoft.com/office/drawing/2014/main" id="{2AC779A3-2F78-CEFF-DADF-B1AF64D891E9}"/>
+              </a:ext>
+            </a:extLst>
+          </p:cNvPr>
+          <p:cNvPicPr>
+            <a:picLocks noChangeAspect="1"/>
+          </p:cNvPicPr>
+          <p:nvPr/>
+        </p:nvPicPr>
+        <p:blipFill>
+          <a:blip r:embed="rId4">
+            <a:extLst>
+              <a:ext uri="{28A0092B-C50C-407E-A947-70E740481C1C}">
+                <a14:useLocalDpi xmlns:a14="http://schemas.microsoft.com/office/drawing/2010/main" val="0"/>
+              </a:ext>
+            </a:extLst>
+          </a:blip>
+          <a:srcRect l="10897" t="10981" r="9294" b="9554"/>
+          <a:stretch/>
+        </p:blipFill>
+        <p:spPr>
+          <a:xfrm>
+            <a:off x="631425" y="1314285"/>
+            <a:ext cx="881078" cy="764816"/>
+          </a:xfrm>
+          <a:prstGeom prst="rect">
+            <a:avLst/>
+          </a:prstGeom>
+        </p:spPr>
+      </p:pic>
+      <p:sp>
+        <p:nvSpPr>
+          <p:cNvPr id="4" name="TextBox 3">
+            <a:extLst>
+              <a:ext uri="{FF2B5EF4-FFF2-40B4-BE49-F238E27FC236}">
+                <a16:creationId xmlns:a16="http://schemas.microsoft.com/office/drawing/2014/main" id="{4CFD56CB-2BA5-3C24-4274-7CC3E331D223}"/>
+              </a:ext>
+            </a:extLst>
+          </p:cNvPr>
+          <p:cNvSpPr txBox="1"/>
+          <p:nvPr/>
+        </p:nvSpPr>
+        <p:spPr>
+          <a:xfrm>
+            <a:off x="587368" y="2034438"/>
+            <a:ext cx="158684" cy="184666"/>
+          </a:xfrm>
+          <a:prstGeom prst="rect">
+            <a:avLst/>
+          </a:prstGeom>
+          <a:noFill/>
+        </p:spPr>
+        <p:txBody>
+          <a:bodyPr wrap="square" rtlCol="0">
+            <a:spAutoFit/>
+          </a:bodyPr>
+          <a:lstStyle/>
+          <a:p>
+            <a:pPr algn="ctr"/>
+            <a:r>
+              <a:rPr lang="en-US" sz="600" dirty="0">
+                <a:solidFill>
+                  <a:srgbClr val="333333"/>
+                </a:solidFill>
+                <a:latin typeface="Calibri Light" panose="020F0302020204030204" pitchFamily="34" charset="0"/>
+                <a:cs typeface="Calibri Light" panose="020F0302020204030204" pitchFamily="34" charset="0"/>
+              </a:rPr>
+              <a:t>0</a:t>
+            </a:r>
+            <a:endParaRPr lang="en-GB" sz="600" dirty="0">
+              <a:solidFill>
+                <a:srgbClr val="333333"/>
+              </a:solidFill>
+              <a:latin typeface="Calibri Light" panose="020F0302020204030204" pitchFamily="34" charset="0"/>
+              <a:cs typeface="Calibri Light" panose="020F0302020204030204" pitchFamily="34" charset="0"/>
+            </a:endParaRPr>
+          </a:p>
+        </p:txBody>
+      </p:sp>
+      <p:sp>
+        <p:nvSpPr>
+          <p:cNvPr id="5" name="TextBox 4">
+            <a:extLst>
+              <a:ext uri="{FF2B5EF4-FFF2-40B4-BE49-F238E27FC236}">
+                <a16:creationId xmlns:a16="http://schemas.microsoft.com/office/drawing/2014/main" id="{F9DEE6FF-D6AA-D3A4-1B8F-F892AE389397}"/>
+              </a:ext>
+            </a:extLst>
+          </p:cNvPr>
+          <p:cNvSpPr txBox="1"/>
+          <p:nvPr/>
+        </p:nvSpPr>
+        <p:spPr>
+          <a:xfrm>
+            <a:off x="751132" y="2034438"/>
+            <a:ext cx="158684" cy="184666"/>
+          </a:xfrm>
+          <a:prstGeom prst="rect">
+            <a:avLst/>
+          </a:prstGeom>
+          <a:noFill/>
+        </p:spPr>
+        <p:txBody>
+          <a:bodyPr wrap="square" rtlCol="0">
+            <a:spAutoFit/>
+          </a:bodyPr>
+          <a:lstStyle/>
+          <a:p>
+            <a:pPr algn="ctr"/>
+            <a:r>
+              <a:rPr lang="en-US" sz="600" dirty="0">
+                <a:solidFill>
+                  <a:srgbClr val="333333"/>
+                </a:solidFill>
+                <a:latin typeface="Calibri Light" panose="020F0302020204030204" pitchFamily="34" charset="0"/>
+                <a:cs typeface="Calibri Light" panose="020F0302020204030204" pitchFamily="34" charset="0"/>
+              </a:rPr>
+              <a:t>1</a:t>
+            </a:r>
+            <a:endParaRPr lang="en-GB" sz="600" dirty="0">
+              <a:solidFill>
+                <a:srgbClr val="333333"/>
+              </a:solidFill>
+              <a:latin typeface="Calibri Light" panose="020F0302020204030204" pitchFamily="34" charset="0"/>
+              <a:cs typeface="Calibri Light" panose="020F0302020204030204" pitchFamily="34" charset="0"/>
+            </a:endParaRPr>
+          </a:p>
+        </p:txBody>
+      </p:sp>
+      <p:sp>
+        <p:nvSpPr>
+          <p:cNvPr id="6" name="TextBox 5">
+            <a:extLst>
+              <a:ext uri="{FF2B5EF4-FFF2-40B4-BE49-F238E27FC236}">
+                <a16:creationId xmlns:a16="http://schemas.microsoft.com/office/drawing/2014/main" id="{FD71727C-9004-3A14-698D-77D17BE5D7EC}"/>
+              </a:ext>
+            </a:extLst>
+          </p:cNvPr>
+          <p:cNvSpPr txBox="1"/>
+          <p:nvPr/>
+        </p:nvSpPr>
+        <p:spPr>
+          <a:xfrm>
+            <a:off x="914896" y="2034438"/>
+            <a:ext cx="158684" cy="184666"/>
+          </a:xfrm>
+          <a:prstGeom prst="rect">
+            <a:avLst/>
+          </a:prstGeom>
+          <a:noFill/>
+        </p:spPr>
+        <p:txBody>
+          <a:bodyPr wrap="square" rtlCol="0">
+            <a:spAutoFit/>
+          </a:bodyPr>
+          <a:lstStyle/>
+          <a:p>
+            <a:pPr algn="ctr"/>
+            <a:r>
+              <a:rPr lang="en-US" sz="600" dirty="0">
+                <a:solidFill>
+                  <a:srgbClr val="333333"/>
+                </a:solidFill>
+                <a:latin typeface="Calibri Light" panose="020F0302020204030204" pitchFamily="34" charset="0"/>
+                <a:cs typeface="Calibri Light" panose="020F0302020204030204" pitchFamily="34" charset="0"/>
+              </a:rPr>
+              <a:t>2</a:t>
+            </a:r>
+            <a:endParaRPr lang="en-GB" sz="600" dirty="0">
+              <a:solidFill>
+                <a:srgbClr val="333333"/>
+              </a:solidFill>
+              <a:latin typeface="Calibri Light" panose="020F0302020204030204" pitchFamily="34" charset="0"/>
+              <a:cs typeface="Calibri Light" panose="020F0302020204030204" pitchFamily="34" charset="0"/>
+            </a:endParaRPr>
+          </a:p>
+        </p:txBody>
+      </p:sp>
+      <p:sp>
+        <p:nvSpPr>
+          <p:cNvPr id="7" name="TextBox 6">
+            <a:extLst>
+              <a:ext uri="{FF2B5EF4-FFF2-40B4-BE49-F238E27FC236}">
+                <a16:creationId xmlns:a16="http://schemas.microsoft.com/office/drawing/2014/main" id="{AC24FE6F-76E9-183F-E2C2-8F82EB8E41D2}"/>
+              </a:ext>
+            </a:extLst>
+          </p:cNvPr>
+          <p:cNvSpPr txBox="1"/>
+          <p:nvPr/>
+        </p:nvSpPr>
+        <p:spPr>
+          <a:xfrm>
+            <a:off x="1078660" y="2034438"/>
+            <a:ext cx="158684" cy="184666"/>
+          </a:xfrm>
+          <a:prstGeom prst="rect">
+            <a:avLst/>
+          </a:prstGeom>
+          <a:noFill/>
+        </p:spPr>
+        <p:txBody>
+          <a:bodyPr wrap="square" rtlCol="0">
+            <a:spAutoFit/>
+          </a:bodyPr>
+          <a:lstStyle/>
+          <a:p>
+            <a:pPr algn="ctr"/>
+            <a:r>
+              <a:rPr lang="en-US" sz="600" dirty="0">
+                <a:solidFill>
+                  <a:srgbClr val="333333"/>
+                </a:solidFill>
+                <a:latin typeface="Calibri Light" panose="020F0302020204030204" pitchFamily="34" charset="0"/>
+                <a:cs typeface="Calibri Light" panose="020F0302020204030204" pitchFamily="34" charset="0"/>
+              </a:rPr>
+              <a:t>3</a:t>
+            </a:r>
+            <a:endParaRPr lang="en-GB" sz="600" dirty="0">
+              <a:solidFill>
+                <a:srgbClr val="333333"/>
+              </a:solidFill>
+              <a:latin typeface="Calibri Light" panose="020F0302020204030204" pitchFamily="34" charset="0"/>
+              <a:cs typeface="Calibri Light" panose="020F0302020204030204" pitchFamily="34" charset="0"/>
+            </a:endParaRPr>
+          </a:p>
+        </p:txBody>
+      </p:sp>
+      <p:sp>
+        <p:nvSpPr>
+          <p:cNvPr id="8" name="TextBox 7">
+            <a:extLst>
+              <a:ext uri="{FF2B5EF4-FFF2-40B4-BE49-F238E27FC236}">
+                <a16:creationId xmlns:a16="http://schemas.microsoft.com/office/drawing/2014/main" id="{83DA8E06-AB13-6BC9-F39C-691A6BB7E371}"/>
+              </a:ext>
+            </a:extLst>
+          </p:cNvPr>
+          <p:cNvSpPr txBox="1"/>
+          <p:nvPr/>
+        </p:nvSpPr>
+        <p:spPr>
+          <a:xfrm>
+            <a:off x="1242424" y="2034438"/>
+            <a:ext cx="158684" cy="184666"/>
+          </a:xfrm>
+          <a:prstGeom prst="rect">
+            <a:avLst/>
+          </a:prstGeom>
+          <a:noFill/>
+        </p:spPr>
+        <p:txBody>
+          <a:bodyPr wrap="square" rtlCol="0">
+            <a:spAutoFit/>
+          </a:bodyPr>
+          <a:lstStyle/>
+          <a:p>
+            <a:pPr algn="ctr"/>
+            <a:r>
+              <a:rPr lang="en-US" sz="600" dirty="0">
+                <a:solidFill>
+                  <a:srgbClr val="333333"/>
+                </a:solidFill>
+                <a:latin typeface="Calibri Light" panose="020F0302020204030204" pitchFamily="34" charset="0"/>
+                <a:cs typeface="Calibri Light" panose="020F0302020204030204" pitchFamily="34" charset="0"/>
+              </a:rPr>
+              <a:t>4</a:t>
+            </a:r>
+            <a:endParaRPr lang="en-GB" sz="600" dirty="0">
+              <a:solidFill>
+                <a:srgbClr val="333333"/>
+              </a:solidFill>
+              <a:latin typeface="Calibri Light" panose="020F0302020204030204" pitchFamily="34" charset="0"/>
+              <a:cs typeface="Calibri Light" panose="020F0302020204030204" pitchFamily="34" charset="0"/>
+            </a:endParaRPr>
+          </a:p>
+        </p:txBody>
+      </p:sp>
+      <p:sp>
+        <p:nvSpPr>
+          <p:cNvPr id="9" name="TextBox 8">
+            <a:extLst>
+              <a:ext uri="{FF2B5EF4-FFF2-40B4-BE49-F238E27FC236}">
+                <a16:creationId xmlns:a16="http://schemas.microsoft.com/office/drawing/2014/main" id="{5EA79853-4A16-E2A1-24AC-7446A89D913D}"/>
+              </a:ext>
+            </a:extLst>
+          </p:cNvPr>
+          <p:cNvSpPr txBox="1"/>
+          <p:nvPr/>
+        </p:nvSpPr>
+        <p:spPr>
+          <a:xfrm>
+            <a:off x="1406188" y="2034438"/>
+            <a:ext cx="158684" cy="184666"/>
+          </a:xfrm>
+          <a:prstGeom prst="rect">
+            <a:avLst/>
+          </a:prstGeom>
+          <a:noFill/>
+        </p:spPr>
+        <p:txBody>
+          <a:bodyPr wrap="square" rtlCol="0">
+            <a:spAutoFit/>
+          </a:bodyPr>
+          <a:lstStyle/>
+          <a:p>
+            <a:pPr algn="ctr"/>
+            <a:r>
+              <a:rPr lang="en-US" sz="600" dirty="0">
+                <a:solidFill>
+                  <a:srgbClr val="333333"/>
+                </a:solidFill>
+                <a:latin typeface="Calibri Light" panose="020F0302020204030204" pitchFamily="34" charset="0"/>
+                <a:cs typeface="Calibri Light" panose="020F0302020204030204" pitchFamily="34" charset="0"/>
+              </a:rPr>
+              <a:t>5</a:t>
+            </a:r>
+            <a:endParaRPr lang="en-GB" sz="600" dirty="0">
+              <a:solidFill>
+                <a:srgbClr val="333333"/>
+              </a:solidFill>
+              <a:latin typeface="Calibri Light" panose="020F0302020204030204" pitchFamily="34" charset="0"/>
+              <a:cs typeface="Calibri Light" panose="020F0302020204030204" pitchFamily="34" charset="0"/>
+            </a:endParaRPr>
+          </a:p>
+        </p:txBody>
+      </p:sp>
+      <p:sp>
+        <p:nvSpPr>
+          <p:cNvPr id="10" name="TextBox 9">
+            <a:extLst>
+              <a:ext uri="{FF2B5EF4-FFF2-40B4-BE49-F238E27FC236}">
+                <a16:creationId xmlns:a16="http://schemas.microsoft.com/office/drawing/2014/main" id="{5AFED677-38B3-0F2F-3E5C-27D03445D9B1}"/>
+              </a:ext>
+            </a:extLst>
+          </p:cNvPr>
+          <p:cNvSpPr txBox="1"/>
+          <p:nvPr/>
+        </p:nvSpPr>
+        <p:spPr>
+          <a:xfrm>
+            <a:off x="448823" y="1872104"/>
+            <a:ext cx="264208" cy="184666"/>
+          </a:xfrm>
+          <a:prstGeom prst="rect">
+            <a:avLst/>
+          </a:prstGeom>
+          <a:noFill/>
+        </p:spPr>
+        <p:txBody>
+          <a:bodyPr wrap="square" rtlCol="0">
+            <a:spAutoFit/>
+          </a:bodyPr>
+          <a:lstStyle/>
+          <a:p>
+            <a:pPr algn="r"/>
+            <a:r>
+              <a:rPr lang="en-US" sz="600" dirty="0">
+                <a:solidFill>
+                  <a:srgbClr val="333333"/>
+                </a:solidFill>
+                <a:latin typeface="Calibri Light" panose="020F0302020204030204" pitchFamily="34" charset="0"/>
+                <a:cs typeface="Calibri Light" panose="020F0302020204030204" pitchFamily="34" charset="0"/>
+              </a:rPr>
+              <a:t>2</a:t>
+            </a:r>
+            <a:endParaRPr lang="en-GB" sz="600" dirty="0">
+              <a:solidFill>
+                <a:srgbClr val="333333"/>
+              </a:solidFill>
+              <a:latin typeface="Calibri Light" panose="020F0302020204030204" pitchFamily="34" charset="0"/>
+              <a:cs typeface="Calibri Light" panose="020F0302020204030204" pitchFamily="34" charset="0"/>
+            </a:endParaRPr>
+          </a:p>
+        </p:txBody>
+      </p:sp>
+      <p:sp>
+        <p:nvSpPr>
+          <p:cNvPr id="12" name="TextBox 11">
+            <a:extLst>
+              <a:ext uri="{FF2B5EF4-FFF2-40B4-BE49-F238E27FC236}">
+                <a16:creationId xmlns:a16="http://schemas.microsoft.com/office/drawing/2014/main" id="{6F5546F9-CB50-DD52-CC62-D6D659D21FB0}"/>
+              </a:ext>
+            </a:extLst>
+          </p:cNvPr>
+          <p:cNvSpPr txBox="1"/>
+          <p:nvPr/>
+        </p:nvSpPr>
+        <p:spPr>
+          <a:xfrm>
+            <a:off x="448823" y="1478701"/>
+            <a:ext cx="264208" cy="184666"/>
+          </a:xfrm>
+          <a:prstGeom prst="rect">
+            <a:avLst/>
+          </a:prstGeom>
+          <a:noFill/>
+        </p:spPr>
+        <p:txBody>
+          <a:bodyPr wrap="square" rtlCol="0">
+            <a:spAutoFit/>
+          </a:bodyPr>
+          <a:lstStyle/>
+          <a:p>
+            <a:pPr algn="r"/>
+            <a:r>
+              <a:rPr lang="en-US" sz="600" dirty="0">
+                <a:solidFill>
+                  <a:srgbClr val="333333"/>
+                </a:solidFill>
+                <a:latin typeface="Calibri Light" panose="020F0302020204030204" pitchFamily="34" charset="0"/>
+                <a:cs typeface="Calibri Light" panose="020F0302020204030204" pitchFamily="34" charset="0"/>
+              </a:rPr>
+              <a:t>10</a:t>
+            </a:r>
+            <a:endParaRPr lang="en-GB" sz="600" dirty="0">
+              <a:solidFill>
+                <a:srgbClr val="333333"/>
+              </a:solidFill>
+              <a:latin typeface="Calibri Light" panose="020F0302020204030204" pitchFamily="34" charset="0"/>
+              <a:cs typeface="Calibri Light" panose="020F0302020204030204" pitchFamily="34" charset="0"/>
+            </a:endParaRPr>
+          </a:p>
+        </p:txBody>
+      </p:sp>
+      <p:sp>
+        <p:nvSpPr>
+          <p:cNvPr id="14" name="TextBox 13">
+            <a:extLst>
+              <a:ext uri="{FF2B5EF4-FFF2-40B4-BE49-F238E27FC236}">
+                <a16:creationId xmlns:a16="http://schemas.microsoft.com/office/drawing/2014/main" id="{22FA3513-546F-C72F-3736-768F809B9239}"/>
+              </a:ext>
+            </a:extLst>
+          </p:cNvPr>
+          <p:cNvSpPr txBox="1"/>
+          <p:nvPr/>
+        </p:nvSpPr>
+        <p:spPr>
+          <a:xfrm>
+            <a:off x="448823" y="1675403"/>
+            <a:ext cx="264208" cy="184666"/>
+          </a:xfrm>
+          <a:prstGeom prst="rect">
+            <a:avLst/>
+          </a:prstGeom>
+          <a:noFill/>
+        </p:spPr>
+        <p:txBody>
+          <a:bodyPr wrap="square" rtlCol="0">
+            <a:spAutoFit/>
+          </a:bodyPr>
+          <a:lstStyle/>
+          <a:p>
+            <a:pPr algn="r"/>
+            <a:r>
+              <a:rPr lang="en-US" sz="600" dirty="0">
+                <a:solidFill>
+                  <a:srgbClr val="333333"/>
+                </a:solidFill>
+                <a:latin typeface="Calibri Light" panose="020F0302020204030204" pitchFamily="34" charset="0"/>
+                <a:cs typeface="Calibri Light" panose="020F0302020204030204" pitchFamily="34" charset="0"/>
+              </a:rPr>
+              <a:t>6</a:t>
+            </a:r>
+            <a:endParaRPr lang="en-GB" sz="600" dirty="0">
+              <a:solidFill>
+                <a:srgbClr val="333333"/>
+              </a:solidFill>
+              <a:latin typeface="Calibri Light" panose="020F0302020204030204" pitchFamily="34" charset="0"/>
+              <a:cs typeface="Calibri Light" panose="020F0302020204030204" pitchFamily="34" charset="0"/>
+            </a:endParaRPr>
+          </a:p>
+        </p:txBody>
+      </p:sp>
+      <p:sp>
+        <p:nvSpPr>
+          <p:cNvPr id="15" name="TextBox 14">
+            <a:extLst>
+              <a:ext uri="{FF2B5EF4-FFF2-40B4-BE49-F238E27FC236}">
+                <a16:creationId xmlns:a16="http://schemas.microsoft.com/office/drawing/2014/main" id="{CB5C5868-E424-7CD4-5CDE-B799844A885B}"/>
+              </a:ext>
+            </a:extLst>
+          </p:cNvPr>
+          <p:cNvSpPr txBox="1"/>
+          <p:nvPr/>
+        </p:nvSpPr>
+        <p:spPr>
+          <a:xfrm>
+            <a:off x="448823" y="1281999"/>
+            <a:ext cx="264208" cy="184666"/>
+          </a:xfrm>
+          <a:prstGeom prst="rect">
+            <a:avLst/>
+          </a:prstGeom>
+          <a:noFill/>
+        </p:spPr>
+        <p:txBody>
+          <a:bodyPr wrap="square" rtlCol="0">
+            <a:spAutoFit/>
+          </a:bodyPr>
+          <a:lstStyle/>
+          <a:p>
+            <a:pPr algn="r"/>
+            <a:r>
+              <a:rPr lang="en-US" sz="600" dirty="0">
+                <a:solidFill>
+                  <a:srgbClr val="333333"/>
+                </a:solidFill>
+                <a:latin typeface="Calibri Light" panose="020F0302020204030204" pitchFamily="34" charset="0"/>
+                <a:cs typeface="Calibri Light" panose="020F0302020204030204" pitchFamily="34" charset="0"/>
+              </a:rPr>
+              <a:t>14</a:t>
+            </a:r>
+            <a:endParaRPr lang="en-GB" sz="600" dirty="0">
+              <a:solidFill>
+                <a:srgbClr val="333333"/>
+              </a:solidFill>
+              <a:latin typeface="Calibri Light" panose="020F0302020204030204" pitchFamily="34" charset="0"/>
+              <a:cs typeface="Calibri Light" panose="020F0302020204030204" pitchFamily="34" charset="0"/>
+            </a:endParaRPr>
+          </a:p>
+        </p:txBody>
+      </p:sp>
+      <p:sp>
+        <p:nvSpPr>
+          <p:cNvPr id="16" name="TextBox 15">
+            <a:extLst>
+              <a:ext uri="{FF2B5EF4-FFF2-40B4-BE49-F238E27FC236}">
+                <a16:creationId xmlns:a16="http://schemas.microsoft.com/office/drawing/2014/main" id="{680856A1-FEA5-20B4-16FD-C9DA06B7AA9C}"/>
+              </a:ext>
+            </a:extLst>
+          </p:cNvPr>
+          <p:cNvSpPr txBox="1"/>
+          <p:nvPr/>
+        </p:nvSpPr>
+        <p:spPr>
+          <a:xfrm>
+            <a:off x="1643176" y="1930417"/>
+            <a:ext cx="571390" cy="184666"/>
+          </a:xfrm>
+          <a:prstGeom prst="rect">
+            <a:avLst/>
+          </a:prstGeom>
+          <a:noFill/>
+        </p:spPr>
+        <p:txBody>
+          <a:bodyPr wrap="square" rtlCol="0">
+            <a:spAutoFit/>
+          </a:bodyPr>
+          <a:lstStyle/>
+          <a:p>
+            <a:r>
+              <a:rPr lang="en-US" sz="600" dirty="0">
+                <a:solidFill>
+                  <a:srgbClr val="333333"/>
+                </a:solidFill>
+                <a:latin typeface="Calibri Light" panose="020F0302020204030204" pitchFamily="34" charset="0"/>
+                <a:cs typeface="Calibri Light" panose="020F0302020204030204" pitchFamily="34" charset="0"/>
+              </a:rPr>
+              <a:t>FB = 1</a:t>
+            </a:r>
+            <a:endParaRPr lang="en-GB" sz="600" dirty="0">
+              <a:solidFill>
+                <a:srgbClr val="333333"/>
+              </a:solidFill>
+              <a:latin typeface="Calibri Light" panose="020F0302020204030204" pitchFamily="34" charset="0"/>
+              <a:cs typeface="Calibri Light" panose="020F0302020204030204" pitchFamily="34" charset="0"/>
+            </a:endParaRPr>
+          </a:p>
+        </p:txBody>
+      </p:sp>
+      <p:cxnSp>
+        <p:nvCxnSpPr>
+          <p:cNvPr id="18" name="Straight Connector 17">
+            <a:extLst>
+              <a:ext uri="{FF2B5EF4-FFF2-40B4-BE49-F238E27FC236}">
+                <a16:creationId xmlns:a16="http://schemas.microsoft.com/office/drawing/2014/main" id="{4036828A-A657-178B-A1F5-BE26E3B05901}"/>
+              </a:ext>
+            </a:extLst>
+          </p:cNvPr>
+          <p:cNvCxnSpPr/>
+          <p:nvPr/>
+        </p:nvCxnSpPr>
+        <p:spPr>
+          <a:xfrm>
+            <a:off x="1520943" y="2013225"/>
+            <a:ext cx="180000" cy="0"/>
+          </a:xfrm>
+          <a:prstGeom prst="line">
+            <a:avLst/>
+          </a:prstGeom>
+          <a:ln w="3175">
+            <a:solidFill>
+              <a:srgbClr val="333333"/>
+            </a:solidFill>
+            <a:headEnd type="triangle" w="sm" len="sm"/>
+          </a:ln>
+        </p:spPr>
+        <p:style>
+          <a:lnRef idx="2">
+            <a:schemeClr val="accent1"/>
+          </a:lnRef>
+          <a:fillRef idx="0">
+            <a:schemeClr val="accent1"/>
+          </a:fillRef>
+          <a:effectRef idx="1">
+            <a:schemeClr val="accent1"/>
+          </a:effectRef>
+          <a:fontRef idx="minor">
+            <a:schemeClr val="tx1"/>
+          </a:fontRef>
+        </p:style>
+      </p:cxnSp>
     </p:spTree>
     <p:extLst>
       <p:ext uri="{BB962C8B-B14F-4D97-AF65-F5344CB8AC3E}">

</xml_diff>

<commit_message>
Improved figure of the overall scores
</commit_message>
<xml_diff>
--- a/chapter_05/figures/rainfall_based_ff_verif_overall_scores.pptx
+++ b/chapter_05/figures/rainfall_based_ff_verif_overall_scores.pptx
@@ -115,7 +115,7 @@
 <file path=ppt/revisionInfo.xml><?xml version="1.0" encoding="utf-8"?>
 <p1510:revInfo xmlns:a="http://schemas.openxmlformats.org/drawingml/2006/main" xmlns:r="http://schemas.openxmlformats.org/officeDocument/2006/relationships" xmlns:p1510="http://schemas.microsoft.com/office/powerpoint/2015/10/main">
   <p1510:revLst>
-    <p1510:client id="{81937EDE-744E-40B0-955C-4DD4FF246C01}" v="36" dt="2025-05-24T16:00:06.088"/>
+    <p1510:client id="{81937EDE-744E-40B0-955C-4DD4FF246C01}" v="40" dt="2025-05-24T16:23:20.884"/>
   </p1510:revLst>
 </p1510:revInfo>
 </file>
@@ -125,18 +125,18 @@
   <pc:docChgLst>
     <pc:chgData name="Fatima Pillosu" userId="a6295d4dc9e22643" providerId="LiveId" clId="{81937EDE-744E-40B0-955C-4DD4FF246C01}"/>
     <pc:docChg chg="undo custSel modSld">
-      <pc:chgData name="Fatima Pillosu" userId="a6295d4dc9e22643" providerId="LiveId" clId="{81937EDE-744E-40B0-955C-4DD4FF246C01}" dt="2025-05-24T16:02:33.435" v="958" actId="1038"/>
+      <pc:chgData name="Fatima Pillosu" userId="a6295d4dc9e22643" providerId="LiveId" clId="{81937EDE-744E-40B0-955C-4DD4FF246C01}" dt="2025-05-24T16:23:42.622" v="1163" actId="20577"/>
       <pc:docMkLst>
         <pc:docMk/>
       </pc:docMkLst>
       <pc:sldChg chg="addSp delSp modSp mod">
-        <pc:chgData name="Fatima Pillosu" userId="a6295d4dc9e22643" providerId="LiveId" clId="{81937EDE-744E-40B0-955C-4DD4FF246C01}" dt="2025-05-24T16:02:33.435" v="958" actId="1038"/>
+        <pc:chgData name="Fatima Pillosu" userId="a6295d4dc9e22643" providerId="LiveId" clId="{81937EDE-744E-40B0-955C-4DD4FF246C01}" dt="2025-05-24T16:23:42.622" v="1163" actId="20577"/>
         <pc:sldMkLst>
           <pc:docMk/>
           <pc:sldMk cId="4122425894" sldId="256"/>
         </pc:sldMkLst>
         <pc:spChg chg="add mod">
-          <ac:chgData name="Fatima Pillosu" userId="a6295d4dc9e22643" providerId="LiveId" clId="{81937EDE-744E-40B0-955C-4DD4FF246C01}" dt="2025-05-24T16:02:33.435" v="958" actId="1038"/>
+          <ac:chgData name="Fatima Pillosu" userId="a6295d4dc9e22643" providerId="LiveId" clId="{81937EDE-744E-40B0-955C-4DD4FF246C01}" dt="2025-05-24T16:22:15.304" v="1111" actId="1037"/>
           <ac:spMkLst>
             <pc:docMk/>
             <pc:sldMk cId="4122425894" sldId="256"/>
@@ -144,7 +144,7 @@
           </ac:spMkLst>
         </pc:spChg>
         <pc:spChg chg="add mod">
-          <ac:chgData name="Fatima Pillosu" userId="a6295d4dc9e22643" providerId="LiveId" clId="{81937EDE-744E-40B0-955C-4DD4FF246C01}" dt="2025-05-24T16:02:33.435" v="958" actId="1038"/>
+          <ac:chgData name="Fatima Pillosu" userId="a6295d4dc9e22643" providerId="LiveId" clId="{81937EDE-744E-40B0-955C-4DD4FF246C01}" dt="2025-05-24T16:22:15.304" v="1111" actId="1037"/>
           <ac:spMkLst>
             <pc:docMk/>
             <pc:sldMk cId="4122425894" sldId="256"/>
@@ -152,7 +152,7 @@
           </ac:spMkLst>
         </pc:spChg>
         <pc:spChg chg="add mod">
-          <ac:chgData name="Fatima Pillosu" userId="a6295d4dc9e22643" providerId="LiveId" clId="{81937EDE-744E-40B0-955C-4DD4FF246C01}" dt="2025-05-24T16:02:33.435" v="958" actId="1038"/>
+          <ac:chgData name="Fatima Pillosu" userId="a6295d4dc9e22643" providerId="LiveId" clId="{81937EDE-744E-40B0-955C-4DD4FF246C01}" dt="2025-05-24T16:22:15.304" v="1111" actId="1037"/>
           <ac:spMkLst>
             <pc:docMk/>
             <pc:sldMk cId="4122425894" sldId="256"/>
@@ -160,7 +160,7 @@
           </ac:spMkLst>
         </pc:spChg>
         <pc:spChg chg="add mod">
-          <ac:chgData name="Fatima Pillosu" userId="a6295d4dc9e22643" providerId="LiveId" clId="{81937EDE-744E-40B0-955C-4DD4FF246C01}" dt="2025-05-24T16:02:33.435" v="958" actId="1038"/>
+          <ac:chgData name="Fatima Pillosu" userId="a6295d4dc9e22643" providerId="LiveId" clId="{81937EDE-744E-40B0-955C-4DD4FF246C01}" dt="2025-05-24T16:22:15.304" v="1111" actId="1037"/>
           <ac:spMkLst>
             <pc:docMk/>
             <pc:sldMk cId="4122425894" sldId="256"/>
@@ -176,7 +176,7 @@
           </ac:spMkLst>
         </pc:spChg>
         <pc:spChg chg="add mod">
-          <ac:chgData name="Fatima Pillosu" userId="a6295d4dc9e22643" providerId="LiveId" clId="{81937EDE-744E-40B0-955C-4DD4FF246C01}" dt="2025-05-24T16:02:33.435" v="958" actId="1038"/>
+          <ac:chgData name="Fatima Pillosu" userId="a6295d4dc9e22643" providerId="LiveId" clId="{81937EDE-744E-40B0-955C-4DD4FF246C01}" dt="2025-05-24T16:22:15.304" v="1111" actId="1037"/>
           <ac:spMkLst>
             <pc:docMk/>
             <pc:sldMk cId="4122425894" sldId="256"/>
@@ -184,7 +184,7 @@
           </ac:spMkLst>
         </pc:spChg>
         <pc:spChg chg="add mod">
-          <ac:chgData name="Fatima Pillosu" userId="a6295d4dc9e22643" providerId="LiveId" clId="{81937EDE-744E-40B0-955C-4DD4FF246C01}" dt="2025-05-24T16:02:33.435" v="958" actId="1038"/>
+          <ac:chgData name="Fatima Pillosu" userId="a6295d4dc9e22643" providerId="LiveId" clId="{81937EDE-744E-40B0-955C-4DD4FF246C01}" dt="2025-05-24T16:22:15.304" v="1111" actId="1037"/>
           <ac:spMkLst>
             <pc:docMk/>
             <pc:sldMk cId="4122425894" sldId="256"/>
@@ -192,7 +192,7 @@
           </ac:spMkLst>
         </pc:spChg>
         <pc:spChg chg="add mod">
-          <ac:chgData name="Fatima Pillosu" userId="a6295d4dc9e22643" providerId="LiveId" clId="{81937EDE-744E-40B0-955C-4DD4FF246C01}" dt="2025-05-24T16:02:33.435" v="958" actId="1038"/>
+          <ac:chgData name="Fatima Pillosu" userId="a6295d4dc9e22643" providerId="LiveId" clId="{81937EDE-744E-40B0-955C-4DD4FF246C01}" dt="2025-05-24T16:22:15.304" v="1111" actId="1037"/>
           <ac:spMkLst>
             <pc:docMk/>
             <pc:sldMk cId="4122425894" sldId="256"/>
@@ -208,7 +208,7 @@
           </ac:spMkLst>
         </pc:spChg>
         <pc:spChg chg="add mod">
-          <ac:chgData name="Fatima Pillosu" userId="a6295d4dc9e22643" providerId="LiveId" clId="{81937EDE-744E-40B0-955C-4DD4FF246C01}" dt="2025-05-24T16:02:33.435" v="958" actId="1038"/>
+          <ac:chgData name="Fatima Pillosu" userId="a6295d4dc9e22643" providerId="LiveId" clId="{81937EDE-744E-40B0-955C-4DD4FF246C01}" dt="2025-05-24T16:22:15.304" v="1111" actId="1037"/>
           <ac:spMkLst>
             <pc:docMk/>
             <pc:sldMk cId="4122425894" sldId="256"/>
@@ -224,7 +224,7 @@
           </ac:spMkLst>
         </pc:spChg>
         <pc:spChg chg="add mod">
-          <ac:chgData name="Fatima Pillosu" userId="a6295d4dc9e22643" providerId="LiveId" clId="{81937EDE-744E-40B0-955C-4DD4FF246C01}" dt="2025-05-24T16:02:33.435" v="958" actId="1038"/>
+          <ac:chgData name="Fatima Pillosu" userId="a6295d4dc9e22643" providerId="LiveId" clId="{81937EDE-744E-40B0-955C-4DD4FF246C01}" dt="2025-05-24T16:22:15.304" v="1111" actId="1037"/>
           <ac:spMkLst>
             <pc:docMk/>
             <pc:sldMk cId="4122425894" sldId="256"/>
@@ -232,7 +232,7 @@
           </ac:spMkLst>
         </pc:spChg>
         <pc:spChg chg="add mod">
-          <ac:chgData name="Fatima Pillosu" userId="a6295d4dc9e22643" providerId="LiveId" clId="{81937EDE-744E-40B0-955C-4DD4FF246C01}" dt="2025-05-24T16:02:33.435" v="958" actId="1038"/>
+          <ac:chgData name="Fatima Pillosu" userId="a6295d4dc9e22643" providerId="LiveId" clId="{81937EDE-744E-40B0-955C-4DD4FF246C01}" dt="2025-05-24T16:22:15.304" v="1111" actId="1037"/>
           <ac:spMkLst>
             <pc:docMk/>
             <pc:sldMk cId="4122425894" sldId="256"/>
@@ -240,11 +240,35 @@
           </ac:spMkLst>
         </pc:spChg>
         <pc:spChg chg="add mod">
-          <ac:chgData name="Fatima Pillosu" userId="a6295d4dc9e22643" providerId="LiveId" clId="{81937EDE-744E-40B0-955C-4DD4FF246C01}" dt="2025-05-24T16:02:33.435" v="958" actId="1038"/>
+          <ac:chgData name="Fatima Pillosu" userId="a6295d4dc9e22643" providerId="LiveId" clId="{81937EDE-744E-40B0-955C-4DD4FF246C01}" dt="2025-05-24T16:22:15.304" v="1111" actId="1037"/>
           <ac:spMkLst>
             <pc:docMk/>
             <pc:sldMk cId="4122425894" sldId="256"/>
             <ac:spMk id="16" creationId="{680856A1-FEA5-20B4-16FD-C9DA06B7AA9C}"/>
+          </ac:spMkLst>
+        </pc:spChg>
+        <pc:spChg chg="add mod">
+          <ac:chgData name="Fatima Pillosu" userId="a6295d4dc9e22643" providerId="LiveId" clId="{81937EDE-744E-40B0-955C-4DD4FF246C01}" dt="2025-05-24T16:22:54.096" v="1136" actId="1036"/>
+          <ac:spMkLst>
+            <pc:docMk/>
+            <pc:sldMk cId="4122425894" sldId="256"/>
+            <ac:spMk id="17" creationId="{9942BCEB-1125-4CA0-7CD8-6A4063077148}"/>
+          </ac:spMkLst>
+        </pc:spChg>
+        <pc:spChg chg="add mod">
+          <ac:chgData name="Fatima Pillosu" userId="a6295d4dc9e22643" providerId="LiveId" clId="{81937EDE-744E-40B0-955C-4DD4FF246C01}" dt="2025-05-24T16:22:28.969" v="1121" actId="1038"/>
+          <ac:spMkLst>
+            <pc:docMk/>
+            <pc:sldMk cId="4122425894" sldId="256"/>
+            <ac:spMk id="20" creationId="{A774BF42-470D-0D2F-0E8F-51C3D1A1FEBE}"/>
+          </ac:spMkLst>
+        </pc:spChg>
+        <pc:spChg chg="add mod">
+          <ac:chgData name="Fatima Pillosu" userId="a6295d4dc9e22643" providerId="LiveId" clId="{81937EDE-744E-40B0-955C-4DD4FF246C01}" dt="2025-05-24T16:23:42.622" v="1163" actId="20577"/>
+          <ac:spMkLst>
+            <pc:docMk/>
+            <pc:sldMk cId="4122425894" sldId="256"/>
+            <ac:spMk id="21" creationId="{FDE335CC-8232-5A7B-BA6B-67F73B52FE52}"/>
           </ac:spMkLst>
         </pc:spChg>
         <pc:spChg chg="add del mod">
@@ -536,7 +560,7 @@
           </ac:spMkLst>
         </pc:spChg>
         <pc:spChg chg="add mod">
-          <ac:chgData name="Fatima Pillosu" userId="a6295d4dc9e22643" providerId="LiveId" clId="{81937EDE-744E-40B0-955C-4DD4FF246C01}" dt="2025-05-24T15:31:58.647" v="738" actId="1035"/>
+          <ac:chgData name="Fatima Pillosu" userId="a6295d4dc9e22643" providerId="LiveId" clId="{81937EDE-744E-40B0-955C-4DD4FF246C01}" dt="2025-05-24T16:22:15.304" v="1111" actId="1037"/>
           <ac:spMkLst>
             <pc:docMk/>
             <pc:sldMk cId="4122425894" sldId="256"/>
@@ -544,7 +568,7 @@
           </ac:spMkLst>
         </pc:spChg>
         <pc:spChg chg="add mod">
-          <ac:chgData name="Fatima Pillosu" userId="a6295d4dc9e22643" providerId="LiveId" clId="{81937EDE-744E-40B0-955C-4DD4FF246C01}" dt="2025-05-24T15:31:58.647" v="738" actId="1035"/>
+          <ac:chgData name="Fatima Pillosu" userId="a6295d4dc9e22643" providerId="LiveId" clId="{81937EDE-744E-40B0-955C-4DD4FF246C01}" dt="2025-05-24T16:21:25.998" v="1076" actId="1038"/>
           <ac:spMkLst>
             <pc:docMk/>
             <pc:sldMk cId="4122425894" sldId="256"/>
@@ -552,7 +576,7 @@
           </ac:spMkLst>
         </pc:spChg>
         <pc:picChg chg="add mod modCrop">
-          <ac:chgData name="Fatima Pillosu" userId="a6295d4dc9e22643" providerId="LiveId" clId="{81937EDE-744E-40B0-955C-4DD4FF246C01}" dt="2025-05-24T16:02:33.435" v="958" actId="1038"/>
+          <ac:chgData name="Fatima Pillosu" userId="a6295d4dc9e22643" providerId="LiveId" clId="{81937EDE-744E-40B0-955C-4DD4FF246C01}" dt="2025-05-24T16:22:15.304" v="1111" actId="1037"/>
           <ac:picMkLst>
             <pc:docMk/>
             <pc:sldMk cId="4122425894" sldId="256"/>
@@ -576,7 +600,7 @@
           </ac:picMkLst>
         </pc:picChg>
         <pc:picChg chg="add mod">
-          <ac:chgData name="Fatima Pillosu" userId="a6295d4dc9e22643" providerId="LiveId" clId="{81937EDE-744E-40B0-955C-4DD4FF246C01}" dt="2025-05-24T15:31:58.647" v="738" actId="1035"/>
+          <ac:chgData name="Fatima Pillosu" userId="a6295d4dc9e22643" providerId="LiveId" clId="{81937EDE-744E-40B0-955C-4DD4FF246C01}" dt="2025-05-24T16:22:15.304" v="1111" actId="1037"/>
           <ac:picMkLst>
             <pc:docMk/>
             <pc:sldMk cId="4122425894" sldId="256"/>
@@ -584,13 +608,21 @@
           </ac:picMkLst>
         </pc:picChg>
         <pc:picChg chg="add mod">
-          <ac:chgData name="Fatima Pillosu" userId="a6295d4dc9e22643" providerId="LiveId" clId="{81937EDE-744E-40B0-955C-4DD4FF246C01}" dt="2025-05-24T15:31:58.647" v="738" actId="1035"/>
+          <ac:chgData name="Fatima Pillosu" userId="a6295d4dc9e22643" providerId="LiveId" clId="{81937EDE-744E-40B0-955C-4DD4FF246C01}" dt="2025-05-24T16:21:25.998" v="1076" actId="1038"/>
           <ac:picMkLst>
             <pc:docMk/>
             <pc:sldMk cId="4122425894" sldId="256"/>
             <ac:picMk id="54" creationId="{54CBA38D-727F-0A78-5908-70994BD3CBC0}"/>
           </ac:picMkLst>
         </pc:picChg>
+        <pc:cxnChg chg="add mod">
+          <ac:chgData name="Fatima Pillosu" userId="a6295d4dc9e22643" providerId="LiveId" clId="{81937EDE-744E-40B0-955C-4DD4FF246C01}" dt="2025-05-24T16:22:54.096" v="1136" actId="1036"/>
+          <ac:cxnSpMkLst>
+            <pc:docMk/>
+            <pc:sldMk cId="4122425894" sldId="256"/>
+            <ac:cxnSpMk id="2" creationId="{1C3B6113-7DA5-DE91-03B2-E179F9027895}"/>
+          </ac:cxnSpMkLst>
+        </pc:cxnChg>
         <pc:cxnChg chg="add del mod">
           <ac:chgData name="Fatima Pillosu" userId="a6295d4dc9e22643" providerId="LiveId" clId="{81937EDE-744E-40B0-955C-4DD4FF246C01}" dt="2025-05-24T15:31:47.897" v="735" actId="21"/>
           <ac:cxnSpMkLst>
@@ -656,7 +688,7 @@
           </ac:cxnSpMkLst>
         </pc:cxnChg>
         <pc:cxnChg chg="add mod">
-          <ac:chgData name="Fatima Pillosu" userId="a6295d4dc9e22643" providerId="LiveId" clId="{81937EDE-744E-40B0-955C-4DD4FF246C01}" dt="2025-05-24T16:02:33.435" v="958" actId="1038"/>
+          <ac:chgData name="Fatima Pillosu" userId="a6295d4dc9e22643" providerId="LiveId" clId="{81937EDE-744E-40B0-955C-4DD4FF246C01}" dt="2025-05-24T16:22:15.304" v="1111" actId="1037"/>
           <ac:cxnSpMkLst>
             <pc:docMk/>
             <pc:sldMk cId="4122425894" sldId="256"/>
@@ -677,6 +709,14 @@
             <pc:docMk/>
             <pc:sldMk cId="4122425894" sldId="256"/>
             <ac:cxnSpMk id="19" creationId="{30A0FB00-9763-DBFA-458B-D9AD8FC27D2C}"/>
+          </ac:cxnSpMkLst>
+        </pc:cxnChg>
+        <pc:cxnChg chg="add mod">
+          <ac:chgData name="Fatima Pillosu" userId="a6295d4dc9e22643" providerId="LiveId" clId="{81937EDE-744E-40B0-955C-4DD4FF246C01}" dt="2025-05-24T16:22:23.321" v="1117" actId="1037"/>
+          <ac:cxnSpMkLst>
+            <pc:docMk/>
+            <pc:sldMk cId="4122425894" sldId="256"/>
+            <ac:cxnSpMk id="19" creationId="{340882ED-88AE-1428-CC8B-4153E0855D86}"/>
           </ac:cxnSpMkLst>
         </pc:cxnChg>
         <pc:cxnChg chg="add del mod">
@@ -3751,7 +3791,7 @@
         </p:blipFill>
         <p:spPr>
           <a:xfrm>
-            <a:off x="11908" y="884883"/>
+            <a:off x="30958" y="884883"/>
             <a:ext cx="2016000" cy="1980000"/>
           </a:xfrm>
           <a:prstGeom prst="rect">
@@ -3786,7 +3826,7 @@
         </p:blipFill>
         <p:spPr>
           <a:xfrm>
-            <a:off x="2111396" y="884883"/>
+            <a:off x="2130446" y="884883"/>
             <a:ext cx="2016000" cy="1980000"/>
           </a:xfrm>
           <a:prstGeom prst="rect">
@@ -4700,7 +4740,7 @@
         </p:nvSpPr>
         <p:spPr>
           <a:xfrm>
-            <a:off x="1703636" y="1343555"/>
+            <a:off x="1722686" y="1343555"/>
             <a:ext cx="244800" cy="246221"/>
           </a:xfrm>
           <a:prstGeom prst="rect">
@@ -4754,7 +4794,7 @@
         </p:nvSpPr>
         <p:spPr>
           <a:xfrm>
-            <a:off x="3795405" y="987133"/>
+            <a:off x="3814455" y="987133"/>
             <a:ext cx="244800" cy="246221"/>
           </a:xfrm>
           <a:prstGeom prst="rect">
@@ -4821,7 +4861,7 @@
         </p:blipFill>
         <p:spPr>
           <a:xfrm>
-            <a:off x="631425" y="1314285"/>
+            <a:off x="559035" y="1314285"/>
             <a:ext cx="881078" cy="764816"/>
           </a:xfrm>
           <a:prstGeom prst="rect">
@@ -4843,7 +4883,7 @@
         </p:nvSpPr>
         <p:spPr>
           <a:xfrm>
-            <a:off x="587368" y="2034438"/>
+            <a:off x="514978" y="2034438"/>
             <a:ext cx="158684" cy="184666"/>
           </a:xfrm>
           <a:prstGeom prst="rect">
@@ -4892,7 +4932,7 @@
         </p:nvSpPr>
         <p:spPr>
           <a:xfrm>
-            <a:off x="751132" y="2034438"/>
+            <a:off x="678742" y="2034438"/>
             <a:ext cx="158684" cy="184666"/>
           </a:xfrm>
           <a:prstGeom prst="rect">
@@ -4941,7 +4981,7 @@
         </p:nvSpPr>
         <p:spPr>
           <a:xfrm>
-            <a:off x="914896" y="2034438"/>
+            <a:off x="842506" y="2034438"/>
             <a:ext cx="158684" cy="184666"/>
           </a:xfrm>
           <a:prstGeom prst="rect">
@@ -4990,7 +5030,7 @@
         </p:nvSpPr>
         <p:spPr>
           <a:xfrm>
-            <a:off x="1078660" y="2034438"/>
+            <a:off x="1006270" y="2034438"/>
             <a:ext cx="158684" cy="184666"/>
           </a:xfrm>
           <a:prstGeom prst="rect">
@@ -5039,7 +5079,7 @@
         </p:nvSpPr>
         <p:spPr>
           <a:xfrm>
-            <a:off x="1242424" y="2034438"/>
+            <a:off x="1170034" y="2034438"/>
             <a:ext cx="158684" cy="184666"/>
           </a:xfrm>
           <a:prstGeom prst="rect">
@@ -5088,7 +5128,7 @@
         </p:nvSpPr>
         <p:spPr>
           <a:xfrm>
-            <a:off x="1406188" y="2034438"/>
+            <a:off x="1333798" y="2034438"/>
             <a:ext cx="158684" cy="184666"/>
           </a:xfrm>
           <a:prstGeom prst="rect">
@@ -5137,7 +5177,7 @@
         </p:nvSpPr>
         <p:spPr>
           <a:xfrm>
-            <a:off x="448823" y="1872104"/>
+            <a:off x="376433" y="1872104"/>
             <a:ext cx="264208" cy="184666"/>
           </a:xfrm>
           <a:prstGeom prst="rect">
@@ -5186,7 +5226,7 @@
         </p:nvSpPr>
         <p:spPr>
           <a:xfrm>
-            <a:off x="448823" y="1478701"/>
+            <a:off x="376433" y="1478701"/>
             <a:ext cx="264208" cy="184666"/>
           </a:xfrm>
           <a:prstGeom prst="rect">
@@ -5235,7 +5275,7 @@
         </p:nvSpPr>
         <p:spPr>
           <a:xfrm>
-            <a:off x="448823" y="1675403"/>
+            <a:off x="376433" y="1675403"/>
             <a:ext cx="264208" cy="184666"/>
           </a:xfrm>
           <a:prstGeom prst="rect">
@@ -5284,7 +5324,7 @@
         </p:nvSpPr>
         <p:spPr>
           <a:xfrm>
-            <a:off x="448823" y="1281999"/>
+            <a:off x="376433" y="1281999"/>
             <a:ext cx="264208" cy="184666"/>
           </a:xfrm>
           <a:prstGeom prst="rect">
@@ -5333,8 +5373,8 @@
         </p:nvSpPr>
         <p:spPr>
           <a:xfrm>
-            <a:off x="1643176" y="1930417"/>
-            <a:ext cx="571390" cy="184666"/>
+            <a:off x="1486966" y="1877077"/>
+            <a:ext cx="600914" cy="276999"/>
           </a:xfrm>
           <a:prstGeom prst="rect">
             <a:avLst/>
@@ -5356,6 +5396,18 @@
                 <a:cs typeface="Calibri Light" panose="020F0302020204030204" pitchFamily="34" charset="0"/>
               </a:rPr>
               <a:t>FB = 1</a:t>
+            </a:r>
+          </a:p>
+          <a:p>
+            <a:r>
+              <a:rPr lang="en-US" sz="600" dirty="0">
+                <a:solidFill>
+                  <a:srgbClr val="333333"/>
+                </a:solidFill>
+                <a:latin typeface="Calibri Light" panose="020F0302020204030204" pitchFamily="34" charset="0"/>
+                <a:cs typeface="Calibri Light" panose="020F0302020204030204" pitchFamily="34" charset="0"/>
+              </a:rPr>
+              <a:t>(perfect bias)</a:t>
             </a:r>
             <a:endParaRPr lang="en-GB" sz="600" dirty="0">
               <a:solidFill>
@@ -5381,8 +5433,8 @@
         </p:nvCxnSpPr>
         <p:spPr>
           <a:xfrm>
-            <a:off x="1520943" y="2013225"/>
-            <a:ext cx="180000" cy="0"/>
+            <a:off x="1448553" y="2017035"/>
+            <a:ext cx="108000" cy="0"/>
           </a:xfrm>
           <a:prstGeom prst="line">
             <a:avLst/>
@@ -5409,6 +5461,244 @@
           </a:fontRef>
         </p:style>
       </p:cxnSp>
+      <p:cxnSp>
+        <p:nvCxnSpPr>
+          <p:cNvPr id="2" name="Straight Connector 1">
+            <a:extLst>
+              <a:ext uri="{FF2B5EF4-FFF2-40B4-BE49-F238E27FC236}">
+                <a16:creationId xmlns:a16="http://schemas.microsoft.com/office/drawing/2014/main" id="{1C3B6113-7DA5-DE91-03B2-E179F9027895}"/>
+              </a:ext>
+            </a:extLst>
+          </p:cNvPr>
+          <p:cNvCxnSpPr>
+            <a:cxnSpLocks/>
+          </p:cNvCxnSpPr>
+          <p:nvPr/>
+        </p:nvCxnSpPr>
+        <p:spPr>
+          <a:xfrm rot="10800000">
+            <a:off x="30958" y="1187019"/>
+            <a:ext cx="0" cy="933768"/>
+          </a:xfrm>
+          <a:prstGeom prst="line">
+            <a:avLst/>
+          </a:prstGeom>
+          <a:ln w="3175">
+            <a:solidFill>
+              <a:schemeClr val="bg1">
+                <a:lumMod val="75000"/>
+              </a:schemeClr>
+            </a:solidFill>
+            <a:headEnd type="triangle" w="sm" len="sm"/>
+          </a:ln>
+        </p:spPr>
+        <p:style>
+          <a:lnRef idx="2">
+            <a:schemeClr val="accent1"/>
+          </a:lnRef>
+          <a:fillRef idx="0">
+            <a:schemeClr val="accent1"/>
+          </a:fillRef>
+          <a:effectRef idx="1">
+            <a:schemeClr val="accent1"/>
+          </a:effectRef>
+          <a:fontRef idx="minor">
+            <a:schemeClr val="tx1"/>
+          </a:fontRef>
+        </p:style>
+      </p:cxnSp>
+      <p:sp>
+        <p:nvSpPr>
+          <p:cNvPr id="17" name="TextBox 16">
+            <a:extLst>
+              <a:ext uri="{FF2B5EF4-FFF2-40B4-BE49-F238E27FC236}">
+                <a16:creationId xmlns:a16="http://schemas.microsoft.com/office/drawing/2014/main" id="{9942BCEB-1125-4CA0-7CD8-6A4063077148}"/>
+              </a:ext>
+            </a:extLst>
+          </p:cNvPr>
+          <p:cNvSpPr txBox="1"/>
+          <p:nvPr/>
+        </p:nvSpPr>
+        <p:spPr>
+          <a:xfrm rot="16200000">
+            <a:off x="-159185" y="2158764"/>
+            <a:ext cx="380285" cy="184666"/>
+          </a:xfrm>
+          <a:prstGeom prst="rect">
+            <a:avLst/>
+          </a:prstGeom>
+          <a:noFill/>
+        </p:spPr>
+        <p:txBody>
+          <a:bodyPr wrap="square" rtlCol="0">
+            <a:spAutoFit/>
+          </a:bodyPr>
+          <a:lstStyle/>
+          <a:p>
+            <a:r>
+              <a:rPr lang="en-US" sz="600" dirty="0">
+                <a:solidFill>
+                  <a:schemeClr val="bg1">
+                    <a:lumMod val="75000"/>
+                  </a:schemeClr>
+                </a:solidFill>
+                <a:latin typeface="Calibri Light" panose="020F0302020204030204" pitchFamily="34" charset="0"/>
+                <a:cs typeface="Calibri Light" panose="020F0302020204030204" pitchFamily="34" charset="0"/>
+              </a:rPr>
+              <a:t>better</a:t>
+            </a:r>
+            <a:endParaRPr lang="en-GB" sz="600" dirty="0">
+              <a:solidFill>
+                <a:schemeClr val="bg1">
+                  <a:lumMod val="75000"/>
+                </a:schemeClr>
+              </a:solidFill>
+              <a:latin typeface="Calibri Light" panose="020F0302020204030204" pitchFamily="34" charset="0"/>
+              <a:cs typeface="Calibri Light" panose="020F0302020204030204" pitchFamily="34" charset="0"/>
+            </a:endParaRPr>
+          </a:p>
+        </p:txBody>
+      </p:sp>
+      <p:cxnSp>
+        <p:nvCxnSpPr>
+          <p:cNvPr id="19" name="Straight Connector 18">
+            <a:extLst>
+              <a:ext uri="{FF2B5EF4-FFF2-40B4-BE49-F238E27FC236}">
+                <a16:creationId xmlns:a16="http://schemas.microsoft.com/office/drawing/2014/main" id="{340882ED-88AE-1428-CC8B-4153E0855D86}"/>
+              </a:ext>
+            </a:extLst>
+          </p:cNvPr>
+          <p:cNvCxnSpPr>
+            <a:cxnSpLocks/>
+          </p:cNvCxnSpPr>
+          <p:nvPr/>
+        </p:nvCxnSpPr>
+        <p:spPr>
+          <a:xfrm>
+            <a:off x="2116360" y="1486985"/>
+            <a:ext cx="0" cy="933768"/>
+          </a:xfrm>
+          <a:prstGeom prst="line">
+            <a:avLst/>
+          </a:prstGeom>
+          <a:ln w="3175">
+            <a:solidFill>
+              <a:schemeClr val="bg1">
+                <a:lumMod val="75000"/>
+              </a:schemeClr>
+            </a:solidFill>
+            <a:headEnd type="triangle" w="sm" len="sm"/>
+          </a:ln>
+        </p:spPr>
+        <p:style>
+          <a:lnRef idx="2">
+            <a:schemeClr val="accent1"/>
+          </a:lnRef>
+          <a:fillRef idx="0">
+            <a:schemeClr val="accent1"/>
+          </a:fillRef>
+          <a:effectRef idx="1">
+            <a:schemeClr val="accent1"/>
+          </a:effectRef>
+          <a:fontRef idx="minor">
+            <a:schemeClr val="tx1"/>
+          </a:fontRef>
+        </p:style>
+      </p:cxnSp>
+      <p:sp>
+        <p:nvSpPr>
+          <p:cNvPr id="20" name="TextBox 19">
+            <a:extLst>
+              <a:ext uri="{FF2B5EF4-FFF2-40B4-BE49-F238E27FC236}">
+                <a16:creationId xmlns:a16="http://schemas.microsoft.com/office/drawing/2014/main" id="{A774BF42-470D-0D2F-0E8F-51C3D1A1FEBE}"/>
+              </a:ext>
+            </a:extLst>
+          </p:cNvPr>
+          <p:cNvSpPr txBox="1"/>
+          <p:nvPr/>
+        </p:nvSpPr>
+        <p:spPr>
+          <a:xfrm rot="16200000">
+            <a:off x="1927550" y="1279798"/>
+            <a:ext cx="380285" cy="184666"/>
+          </a:xfrm>
+          <a:prstGeom prst="rect">
+            <a:avLst/>
+          </a:prstGeom>
+          <a:noFill/>
+        </p:spPr>
+        <p:txBody>
+          <a:bodyPr wrap="square" rtlCol="0">
+            <a:spAutoFit/>
+          </a:bodyPr>
+          <a:lstStyle/>
+          <a:p>
+            <a:r>
+              <a:rPr lang="en-US" sz="600" dirty="0">
+                <a:solidFill>
+                  <a:schemeClr val="bg1">
+                    <a:lumMod val="75000"/>
+                  </a:schemeClr>
+                </a:solidFill>
+                <a:latin typeface="Calibri Light" panose="020F0302020204030204" pitchFamily="34" charset="0"/>
+                <a:cs typeface="Calibri Light" panose="020F0302020204030204" pitchFamily="34" charset="0"/>
+              </a:rPr>
+              <a:t>better</a:t>
+            </a:r>
+            <a:endParaRPr lang="en-GB" sz="600" dirty="0">
+              <a:solidFill>
+                <a:schemeClr val="bg1">
+                  <a:lumMod val="75000"/>
+                </a:schemeClr>
+              </a:solidFill>
+              <a:latin typeface="Calibri Light" panose="020F0302020204030204" pitchFamily="34" charset="0"/>
+              <a:cs typeface="Calibri Light" panose="020F0302020204030204" pitchFamily="34" charset="0"/>
+            </a:endParaRPr>
+          </a:p>
+        </p:txBody>
+      </p:sp>
+      <p:sp>
+        <p:nvSpPr>
+          <p:cNvPr id="21" name="TextBox 20">
+            <a:extLst>
+              <a:ext uri="{FF2B5EF4-FFF2-40B4-BE49-F238E27FC236}">
+                <a16:creationId xmlns:a16="http://schemas.microsoft.com/office/drawing/2014/main" id="{FDE335CC-8232-5A7B-BA6B-67F73B52FE52}"/>
+              </a:ext>
+            </a:extLst>
+          </p:cNvPr>
+          <p:cNvSpPr txBox="1"/>
+          <p:nvPr/>
+        </p:nvSpPr>
+        <p:spPr>
+          <a:xfrm>
+            <a:off x="2366010" y="2357235"/>
+            <a:ext cx="1774190" cy="184666"/>
+          </a:xfrm>
+          <a:prstGeom prst="rect">
+            <a:avLst/>
+          </a:prstGeom>
+          <a:noFill/>
+        </p:spPr>
+        <p:txBody>
+          <a:bodyPr wrap="square" rtlCol="0">
+            <a:spAutoFit/>
+          </a:bodyPr>
+          <a:lstStyle/>
+          <a:p>
+            <a:pPr algn="ctr"/>
+            <a:r>
+              <a:rPr lang="en-US" sz="600" dirty="0">
+                <a:solidFill>
+                  <a:srgbClr val="333333"/>
+                </a:solidFill>
+                <a:latin typeface="Calibri Light" panose="020F0302020204030204" pitchFamily="34" charset="0"/>
+                <a:cs typeface="Calibri Light" panose="020F0302020204030204" pitchFamily="34" charset="0"/>
+              </a:rPr>
+              <a:t>AROC = 0.5 (no skill)</a:t>
+            </a:r>
+          </a:p>
+        </p:txBody>
+      </p:sp>
     </p:spTree>
     <p:extLst>
       <p:ext uri="{BB962C8B-B14F-4D97-AF65-F5344CB8AC3E}">

</xml_diff>

<commit_message>
Improved the verification scores for the rainfall-based scores
</commit_message>
<xml_diff>
--- a/chapter_05/figures/rainfall_based_ff_verif_overall_scores.pptx
+++ b/chapter_05/figures/rainfall_based_ff_verif_overall_scores.pptx
@@ -125,12 +125,12 @@
   <pc:docChgLst>
     <pc:chgData name="Fatima Pillosu" userId="a6295d4dc9e22643" providerId="LiveId" clId="{81937EDE-744E-40B0-955C-4DD4FF246C01}"/>
     <pc:docChg chg="undo custSel modSld">
-      <pc:chgData name="Fatima Pillosu" userId="a6295d4dc9e22643" providerId="LiveId" clId="{81937EDE-744E-40B0-955C-4DD4FF246C01}" dt="2025-05-24T16:23:42.622" v="1163" actId="20577"/>
+      <pc:chgData name="Fatima Pillosu" userId="a6295d4dc9e22643" providerId="LiveId" clId="{81937EDE-744E-40B0-955C-4DD4FF246C01}" dt="2025-05-24T16:31:25.617" v="1189" actId="20577"/>
       <pc:docMkLst>
         <pc:docMk/>
       </pc:docMkLst>
       <pc:sldChg chg="addSp delSp modSp mod">
-        <pc:chgData name="Fatima Pillosu" userId="a6295d4dc9e22643" providerId="LiveId" clId="{81937EDE-744E-40B0-955C-4DD4FF246C01}" dt="2025-05-24T16:23:42.622" v="1163" actId="20577"/>
+        <pc:chgData name="Fatima Pillosu" userId="a6295d4dc9e22643" providerId="LiveId" clId="{81937EDE-744E-40B0-955C-4DD4FF246C01}" dt="2025-05-24T16:31:25.617" v="1189" actId="20577"/>
         <pc:sldMkLst>
           <pc:docMk/>
           <pc:sldMk cId="4122425894" sldId="256"/>
@@ -464,7 +464,7 @@
           </ac:spMkLst>
         </pc:spChg>
         <pc:spChg chg="add mod">
-          <ac:chgData name="Fatima Pillosu" userId="a6295d4dc9e22643" providerId="LiveId" clId="{81937EDE-744E-40B0-955C-4DD4FF246C01}" dt="2025-05-24T15:31:58.647" v="738" actId="1035"/>
+          <ac:chgData name="Fatima Pillosu" userId="a6295d4dc9e22643" providerId="LiveId" clId="{81937EDE-744E-40B0-955C-4DD4FF246C01}" dt="2025-05-24T16:31:25.617" v="1189" actId="20577"/>
           <ac:spMkLst>
             <pc:docMk/>
             <pc:sldMk cId="4122425894" sldId="256"/>
@@ -3882,7 +3882,27 @@
                 <a:latin typeface="Calibri Light" panose="020F0302020204030204" pitchFamily="34" charset="0"/>
                 <a:cs typeface="Calibri Light" panose="020F0302020204030204" pitchFamily="34" charset="0"/>
               </a:rPr>
-              <a:t>(a) Frequency bias and (b) Area under the ROC curve</a:t>
+              <a:t>(a) </a:t>
+            </a:r>
+            <a:r>
+              <a:rPr lang="en-US" sz="1000">
+                <a:solidFill>
+                  <a:srgbClr val="333333"/>
+                </a:solidFill>
+                <a:latin typeface="Calibri Light" panose="020F0302020204030204" pitchFamily="34" charset="0"/>
+                <a:cs typeface="Calibri Light" panose="020F0302020204030204" pitchFamily="34" charset="0"/>
+              </a:rPr>
+              <a:t>Frequency bias </a:t>
+            </a:r>
+            <a:r>
+              <a:rPr lang="en-US" sz="1000" dirty="0">
+                <a:solidFill>
+                  <a:srgbClr val="333333"/>
+                </a:solidFill>
+                <a:latin typeface="Calibri Light" panose="020F0302020204030204" pitchFamily="34" charset="0"/>
+                <a:cs typeface="Calibri Light" panose="020F0302020204030204" pitchFamily="34" charset="0"/>
+              </a:rPr>
+              <a:t>and (b) Area under the ROC curve</a:t>
             </a:r>
             <a:endParaRPr lang="en-GB" sz="1000" dirty="0">
               <a:solidFill>

</xml_diff>

<commit_message>
Added the ROC curve figures for the remaining returning periods
</commit_message>
<xml_diff>
--- a/chapter_05/figures/rainfall_based_ff_verif_overall_scores.pptx
+++ b/chapter_05/figures/rainfall_based_ff_verif_overall_scores.pptx
@@ -125,12 +125,12 @@
   <pc:docChgLst>
     <pc:chgData name="Fatima Pillosu" userId="a6295d4dc9e22643" providerId="LiveId" clId="{81937EDE-744E-40B0-955C-4DD4FF246C01}"/>
     <pc:docChg chg="undo custSel modSld">
-      <pc:chgData name="Fatima Pillosu" userId="a6295d4dc9e22643" providerId="LiveId" clId="{81937EDE-744E-40B0-955C-4DD4FF246C01}" dt="2025-05-24T16:31:25.617" v="1189" actId="20577"/>
+      <pc:chgData name="Fatima Pillosu" userId="a6295d4dc9e22643" providerId="LiveId" clId="{81937EDE-744E-40B0-955C-4DD4FF246C01}" dt="2025-05-25T06:58:47.281" v="1190" actId="208"/>
       <pc:docMkLst>
         <pc:docMk/>
       </pc:docMkLst>
       <pc:sldChg chg="addSp delSp modSp mod">
-        <pc:chgData name="Fatima Pillosu" userId="a6295d4dc9e22643" providerId="LiveId" clId="{81937EDE-744E-40B0-955C-4DD4FF246C01}" dt="2025-05-24T16:31:25.617" v="1189" actId="20577"/>
+        <pc:chgData name="Fatima Pillosu" userId="a6295d4dc9e22643" providerId="LiveId" clId="{81937EDE-744E-40B0-955C-4DD4FF246C01}" dt="2025-05-25T06:58:47.281" v="1190" actId="208"/>
         <pc:sldMkLst>
           <pc:docMk/>
           <pc:sldMk cId="4122425894" sldId="256"/>
@@ -832,7 +832,7 @@
           </ac:cxnSpMkLst>
         </pc:cxnChg>
         <pc:cxnChg chg="add mod">
-          <ac:chgData name="Fatima Pillosu" userId="a6295d4dc9e22643" providerId="LiveId" clId="{81937EDE-744E-40B0-955C-4DD4FF246C01}" dt="2025-05-24T15:31:58.647" v="738" actId="1035"/>
+          <ac:chgData name="Fatima Pillosu" userId="a6295d4dc9e22643" providerId="LiveId" clId="{81937EDE-744E-40B0-955C-4DD4FF246C01}" dt="2025-05-25T06:58:47.281" v="1190" actId="208"/>
           <ac:cxnSpMkLst>
             <pc:docMk/>
             <pc:sldMk cId="4122425894" sldId="256"/>
@@ -976,7 +976,7 @@
           <a:p>
             <a:fld id="{FF0CBA55-D2F2-4C82-92C8-E6A26451A549}" type="datetimeFigureOut">
               <a:rPr lang="en-GB" smtClean="0"/>
-              <a:t>24/05/2025</a:t>
+              <a:t>25/05/2025</a:t>
             </a:fld>
             <a:endParaRPr lang="en-GB"/>
           </a:p>
@@ -1146,7 +1146,7 @@
           <a:p>
             <a:fld id="{FF0CBA55-D2F2-4C82-92C8-E6A26451A549}" type="datetimeFigureOut">
               <a:rPr lang="en-GB" smtClean="0"/>
-              <a:t>24/05/2025</a:t>
+              <a:t>25/05/2025</a:t>
             </a:fld>
             <a:endParaRPr lang="en-GB"/>
           </a:p>
@@ -1326,7 +1326,7 @@
           <a:p>
             <a:fld id="{FF0CBA55-D2F2-4C82-92C8-E6A26451A549}" type="datetimeFigureOut">
               <a:rPr lang="en-GB" smtClean="0"/>
-              <a:t>24/05/2025</a:t>
+              <a:t>25/05/2025</a:t>
             </a:fld>
             <a:endParaRPr lang="en-GB"/>
           </a:p>
@@ -1496,7 +1496,7 @@
           <a:p>
             <a:fld id="{FF0CBA55-D2F2-4C82-92C8-E6A26451A549}" type="datetimeFigureOut">
               <a:rPr lang="en-GB" smtClean="0"/>
-              <a:t>24/05/2025</a:t>
+              <a:t>25/05/2025</a:t>
             </a:fld>
             <a:endParaRPr lang="en-GB"/>
           </a:p>
@@ -1742,7 +1742,7 @@
           <a:p>
             <a:fld id="{FF0CBA55-D2F2-4C82-92C8-E6A26451A549}" type="datetimeFigureOut">
               <a:rPr lang="en-GB" smtClean="0"/>
-              <a:t>24/05/2025</a:t>
+              <a:t>25/05/2025</a:t>
             </a:fld>
             <a:endParaRPr lang="en-GB"/>
           </a:p>
@@ -1974,7 +1974,7 @@
           <a:p>
             <a:fld id="{FF0CBA55-D2F2-4C82-92C8-E6A26451A549}" type="datetimeFigureOut">
               <a:rPr lang="en-GB" smtClean="0"/>
-              <a:t>24/05/2025</a:t>
+              <a:t>25/05/2025</a:t>
             </a:fld>
             <a:endParaRPr lang="en-GB"/>
           </a:p>
@@ -2341,7 +2341,7 @@
           <a:p>
             <a:fld id="{FF0CBA55-D2F2-4C82-92C8-E6A26451A549}" type="datetimeFigureOut">
               <a:rPr lang="en-GB" smtClean="0"/>
-              <a:t>24/05/2025</a:t>
+              <a:t>25/05/2025</a:t>
             </a:fld>
             <a:endParaRPr lang="en-GB"/>
           </a:p>
@@ -2459,7 +2459,7 @@
           <a:p>
             <a:fld id="{FF0CBA55-D2F2-4C82-92C8-E6A26451A549}" type="datetimeFigureOut">
               <a:rPr lang="en-GB" smtClean="0"/>
-              <a:t>24/05/2025</a:t>
+              <a:t>25/05/2025</a:t>
             </a:fld>
             <a:endParaRPr lang="en-GB"/>
           </a:p>
@@ -2554,7 +2554,7 @@
           <a:p>
             <a:fld id="{FF0CBA55-D2F2-4C82-92C8-E6A26451A549}" type="datetimeFigureOut">
               <a:rPr lang="en-GB" smtClean="0"/>
-              <a:t>24/05/2025</a:t>
+              <a:t>25/05/2025</a:t>
             </a:fld>
             <a:endParaRPr lang="en-GB"/>
           </a:p>
@@ -2831,7 +2831,7 @@
           <a:p>
             <a:fld id="{FF0CBA55-D2F2-4C82-92C8-E6A26451A549}" type="datetimeFigureOut">
               <a:rPr lang="en-GB" smtClean="0"/>
-              <a:t>24/05/2025</a:t>
+              <a:t>25/05/2025</a:t>
             </a:fld>
             <a:endParaRPr lang="en-GB"/>
           </a:p>
@@ -3088,7 +3088,7 @@
           <a:p>
             <a:fld id="{FF0CBA55-D2F2-4C82-92C8-E6A26451A549}" type="datetimeFigureOut">
               <a:rPr lang="en-GB" smtClean="0"/>
-              <a:t>24/05/2025</a:t>
+              <a:t>25/05/2025</a:t>
             </a:fld>
             <a:endParaRPr lang="en-GB"/>
           </a:p>
@@ -3301,7 +3301,7 @@
           <a:p>
             <a:fld id="{FF0CBA55-D2F2-4C82-92C8-E6A26451A549}" type="datetimeFigureOut">
               <a:rPr lang="en-GB" smtClean="0"/>
-              <a:t>24/05/2025</a:t>
+              <a:t>25/05/2025</a:t>
             </a:fld>
             <a:endParaRPr lang="en-GB"/>
           </a:p>

</xml_diff>

<commit_message>
Added the plots for the reliability diagrams for the remaining retur periods
</commit_message>
<xml_diff>
--- a/chapter_05/figures/rainfall_based_ff_verif_overall_scores.pptx
+++ b/chapter_05/figures/rainfall_based_ff_verif_overall_scores.pptx
@@ -125,12 +125,12 @@
   <pc:docChgLst>
     <pc:chgData name="Fatima Pillosu" userId="a6295d4dc9e22643" providerId="LiveId" clId="{81937EDE-744E-40B0-955C-4DD4FF246C01}"/>
     <pc:docChg chg="undo custSel modSld">
-      <pc:chgData name="Fatima Pillosu" userId="a6295d4dc9e22643" providerId="LiveId" clId="{81937EDE-744E-40B0-955C-4DD4FF246C01}" dt="2025-05-25T06:58:47.281" v="1190" actId="208"/>
+      <pc:chgData name="Fatima Pillosu" userId="a6295d4dc9e22643" providerId="LiveId" clId="{81937EDE-744E-40B0-955C-4DD4FF246C01}" dt="2025-05-25T07:18:02.409" v="1191" actId="208"/>
       <pc:docMkLst>
         <pc:docMk/>
       </pc:docMkLst>
       <pc:sldChg chg="addSp delSp modSp mod">
-        <pc:chgData name="Fatima Pillosu" userId="a6295d4dc9e22643" providerId="LiveId" clId="{81937EDE-744E-40B0-955C-4DD4FF246C01}" dt="2025-05-25T06:58:47.281" v="1190" actId="208"/>
+        <pc:chgData name="Fatima Pillosu" userId="a6295d4dc9e22643" providerId="LiveId" clId="{81937EDE-744E-40B0-955C-4DD4FF246C01}" dt="2025-05-25T07:18:02.409" v="1191" actId="208"/>
         <pc:sldMkLst>
           <pc:docMk/>
           <pc:sldMk cId="4122425894" sldId="256"/>
@@ -800,7 +800,7 @@
           </ac:cxnSpMkLst>
         </pc:cxnChg>
         <pc:cxnChg chg="add mod">
-          <ac:chgData name="Fatima Pillosu" userId="a6295d4dc9e22643" providerId="LiveId" clId="{81937EDE-744E-40B0-955C-4DD4FF246C01}" dt="2025-05-24T15:31:58.647" v="738" actId="1035"/>
+          <ac:chgData name="Fatima Pillosu" userId="a6295d4dc9e22643" providerId="LiveId" clId="{81937EDE-744E-40B0-955C-4DD4FF246C01}" dt="2025-05-25T07:18:02.409" v="1191" actId="208"/>
           <ac:cxnSpMkLst>
             <pc:docMk/>
             <pc:sldMk cId="4122425894" sldId="256"/>

</xml_diff>